<commit_message>
Update the slides for game of turns
We remove the high level algorithm. It would be better if a student can come
with one of its own algorithm, review the fork, exec, wait, and signal system
calls and works out a solution.

modified:   labs/game_of_turns.pptx
</commit_message>
<xml_diff>
--- a/labs/game_of_turns.pptx
+++ b/labs/game_of_turns.pptx
@@ -5,13 +5,12 @@
     <p:sldMasterId id="2147483660" r:id="rId1"/>
   </p:sldMasterIdLst>
   <p:notesMasterIdLst>
-    <p:notesMasterId r:id="rId6"/>
+    <p:notesMasterId r:id="rId5"/>
   </p:notesMasterIdLst>
   <p:sldIdLst>
     <p:sldId id="256" r:id="rId2"/>
     <p:sldId id="257" r:id="rId3"/>
-    <p:sldId id="258" r:id="rId4"/>
-    <p:sldId id="259" r:id="rId5"/>
+    <p:sldId id="259" r:id="rId4"/>
   </p:sldIdLst>
   <p:sldSz cx="9144000" cy="6858000" type="screen4x3"/>
   <p:notesSz cx="6858000" cy="9144000"/>
@@ -118,6 +117,10 @@
 </p:presentation>
 </file>
 
+<file path=ppt/revisionInfo.xml><?xml version="1.0" encoding="utf-8"?>
+<p1510:revInfo xmlns:a="http://schemas.openxmlformats.org/drawingml/2006/main" xmlns:r="http://schemas.openxmlformats.org/officeDocument/2006/relationships" xmlns:p1510="http://schemas.microsoft.com/office/powerpoint/2015/10/main"/>
+</file>
+
 <file path=ppt/notesMasters/notesMaster1.xml><?xml version="1.0" encoding="utf-8"?>
 <p:notesMaster xmlns:a="http://schemas.openxmlformats.org/drawingml/2006/main" xmlns:r="http://schemas.openxmlformats.org/officeDocument/2006/relationships" xmlns:p="http://schemas.openxmlformats.org/presentationml/2006/main">
   <p:cSld>
@@ -200,7 +203,7 @@
           <a:p>
             <a:fld id="{0447BC92-E53A-F24D-A51D-7FB076BCC6F1}" type="datetimeFigureOut">
               <a:rPr lang="en-US" smtClean="0"/>
-              <a:t>10/2/17</a:t>
+              <a:t>10/3/2017</a:t>
             </a:fld>
             <a:endParaRPr lang="en-US"/>
           </a:p>
@@ -264,38 +267,37 @@
           <a:p>
             <a:pPr lvl="0"/>
             <a:r>
-              <a:rPr lang="en-US" smtClean="0"/>
+              <a:rPr lang="en-US"/>
               <a:t>Click to edit Master text styles</a:t>
             </a:r>
           </a:p>
           <a:p>
             <a:pPr lvl="1"/>
             <a:r>
-              <a:rPr lang="en-US" smtClean="0"/>
+              <a:rPr lang="en-US"/>
               <a:t>Second level</a:t>
             </a:r>
           </a:p>
           <a:p>
             <a:pPr lvl="2"/>
             <a:r>
-              <a:rPr lang="en-US" smtClean="0"/>
+              <a:rPr lang="en-US"/>
               <a:t>Third level</a:t>
             </a:r>
           </a:p>
           <a:p>
             <a:pPr lvl="3"/>
             <a:r>
-              <a:rPr lang="en-US" smtClean="0"/>
+              <a:rPr lang="en-US"/>
               <a:t>Fourth level</a:t>
             </a:r>
           </a:p>
           <a:p>
             <a:pPr lvl="4"/>
             <a:r>
-              <a:rPr lang="en-US" smtClean="0"/>
+              <a:rPr lang="en-US"/>
               <a:t>Fifth level</a:t>
             </a:r>
-            <a:endParaRPr lang="en-US"/>
           </a:p>
         </p:txBody>
       </p:sp>
@@ -510,7 +512,7 @@
           </a:lstStyle>
           <a:p>
             <a:r>
-              <a:rPr lang="en-US" smtClean="0"/>
+              <a:rPr lang="en-US"/>
               <a:t>Click to edit Master title style</a:t>
             </a:r>
             <a:endParaRPr lang="en-US" dirty="0"/>
@@ -575,7 +577,7 @@
           </a:lstStyle>
           <a:p>
             <a:r>
-              <a:rPr lang="en-US" smtClean="0"/>
+              <a:rPr lang="en-US"/>
               <a:t>Click to edit Master subtitle style</a:t>
             </a:r>
             <a:endParaRPr lang="en-US" dirty="0"/>
@@ -599,7 +601,7 @@
           <a:p>
             <a:fld id="{F39D0AC7-9083-8749-AA05-79D3CDD3A717}" type="datetimeFigureOut">
               <a:rPr lang="en-US" smtClean="0"/>
-              <a:t>10/2/17</a:t>
+              <a:t>10/3/2017</a:t>
             </a:fld>
             <a:endParaRPr lang="en-US"/>
           </a:p>
@@ -688,7 +690,7 @@
           <a:lstStyle/>
           <a:p>
             <a:r>
-              <a:rPr lang="en-US" smtClean="0"/>
+              <a:rPr lang="en-US"/>
               <a:t>Click to edit Master title style</a:t>
             </a:r>
             <a:endParaRPr lang="en-US" dirty="0"/>
@@ -712,35 +714,35 @@
           <a:p>
             <a:pPr lvl="0"/>
             <a:r>
-              <a:rPr lang="en-US" smtClean="0"/>
+              <a:rPr lang="en-US"/>
               <a:t>Click to edit Master text styles</a:t>
             </a:r>
           </a:p>
           <a:p>
             <a:pPr lvl="1"/>
             <a:r>
-              <a:rPr lang="en-US" smtClean="0"/>
+              <a:rPr lang="en-US"/>
               <a:t>Second level</a:t>
             </a:r>
           </a:p>
           <a:p>
             <a:pPr lvl="2"/>
             <a:r>
-              <a:rPr lang="en-US" smtClean="0"/>
+              <a:rPr lang="en-US"/>
               <a:t>Third level</a:t>
             </a:r>
           </a:p>
           <a:p>
             <a:pPr lvl="3"/>
             <a:r>
-              <a:rPr lang="en-US" smtClean="0"/>
+              <a:rPr lang="en-US"/>
               <a:t>Fourth level</a:t>
             </a:r>
           </a:p>
           <a:p>
             <a:pPr lvl="4"/>
             <a:r>
-              <a:rPr lang="en-US" smtClean="0"/>
+              <a:rPr lang="en-US"/>
               <a:t>Fifth level</a:t>
             </a:r>
             <a:endParaRPr lang="en-US" dirty="0"/>
@@ -764,7 +766,7 @@
           <a:p>
             <a:fld id="{F39D0AC7-9083-8749-AA05-79D3CDD3A717}" type="datetimeFigureOut">
               <a:rPr lang="en-US" smtClean="0"/>
-              <a:t>10/2/17</a:t>
+              <a:t>10/3/2017</a:t>
             </a:fld>
             <a:endParaRPr lang="en-US"/>
           </a:p>
@@ -858,7 +860,7 @@
           <a:lstStyle/>
           <a:p>
             <a:r>
-              <a:rPr lang="en-US" smtClean="0"/>
+              <a:rPr lang="en-US"/>
               <a:t>Click to edit Master title style</a:t>
             </a:r>
             <a:endParaRPr lang="en-US" dirty="0"/>
@@ -887,35 +889,35 @@
           <a:p>
             <a:pPr lvl="0"/>
             <a:r>
-              <a:rPr lang="en-US" smtClean="0"/>
+              <a:rPr lang="en-US"/>
               <a:t>Click to edit Master text styles</a:t>
             </a:r>
           </a:p>
           <a:p>
             <a:pPr lvl="1"/>
             <a:r>
-              <a:rPr lang="en-US" smtClean="0"/>
+              <a:rPr lang="en-US"/>
               <a:t>Second level</a:t>
             </a:r>
           </a:p>
           <a:p>
             <a:pPr lvl="2"/>
             <a:r>
-              <a:rPr lang="en-US" smtClean="0"/>
+              <a:rPr lang="en-US"/>
               <a:t>Third level</a:t>
             </a:r>
           </a:p>
           <a:p>
             <a:pPr lvl="3"/>
             <a:r>
-              <a:rPr lang="en-US" smtClean="0"/>
+              <a:rPr lang="en-US"/>
               <a:t>Fourth level</a:t>
             </a:r>
           </a:p>
           <a:p>
             <a:pPr lvl="4"/>
             <a:r>
-              <a:rPr lang="en-US" smtClean="0"/>
+              <a:rPr lang="en-US"/>
               <a:t>Fifth level</a:t>
             </a:r>
             <a:endParaRPr lang="en-US" dirty="0"/>
@@ -939,7 +941,7 @@
           <a:p>
             <a:fld id="{F39D0AC7-9083-8749-AA05-79D3CDD3A717}" type="datetimeFigureOut">
               <a:rPr lang="en-US" smtClean="0"/>
-              <a:t>10/2/17</a:t>
+              <a:t>10/3/2017</a:t>
             </a:fld>
             <a:endParaRPr lang="en-US"/>
           </a:p>
@@ -1028,7 +1030,7 @@
           <a:lstStyle/>
           <a:p>
             <a:r>
-              <a:rPr lang="en-US" smtClean="0"/>
+              <a:rPr lang="en-US"/>
               <a:t>Click to edit Master title style</a:t>
             </a:r>
             <a:endParaRPr lang="en-US" dirty="0"/>
@@ -1052,35 +1054,35 @@
           <a:p>
             <a:pPr lvl="0"/>
             <a:r>
-              <a:rPr lang="en-US" smtClean="0"/>
+              <a:rPr lang="en-US"/>
               <a:t>Click to edit Master text styles</a:t>
             </a:r>
           </a:p>
           <a:p>
             <a:pPr lvl="1"/>
             <a:r>
-              <a:rPr lang="en-US" smtClean="0"/>
+              <a:rPr lang="en-US"/>
               <a:t>Second level</a:t>
             </a:r>
           </a:p>
           <a:p>
             <a:pPr lvl="2"/>
             <a:r>
-              <a:rPr lang="en-US" smtClean="0"/>
+              <a:rPr lang="en-US"/>
               <a:t>Third level</a:t>
             </a:r>
           </a:p>
           <a:p>
             <a:pPr lvl="3"/>
             <a:r>
-              <a:rPr lang="en-US" smtClean="0"/>
+              <a:rPr lang="en-US"/>
               <a:t>Fourth level</a:t>
             </a:r>
           </a:p>
           <a:p>
             <a:pPr lvl="4"/>
             <a:r>
-              <a:rPr lang="en-US" smtClean="0"/>
+              <a:rPr lang="en-US"/>
               <a:t>Fifth level</a:t>
             </a:r>
             <a:endParaRPr lang="en-US" dirty="0"/>
@@ -1104,7 +1106,7 @@
           <a:p>
             <a:fld id="{F39D0AC7-9083-8749-AA05-79D3CDD3A717}" type="datetimeFigureOut">
               <a:rPr lang="en-US" smtClean="0"/>
-              <a:t>10/2/17</a:t>
+              <a:t>10/3/2017</a:t>
             </a:fld>
             <a:endParaRPr lang="en-US"/>
           </a:p>
@@ -1202,7 +1204,7 @@
           </a:lstStyle>
           <a:p>
             <a:r>
-              <a:rPr lang="en-US" smtClean="0"/>
+              <a:rPr lang="en-US"/>
               <a:t>Click to edit Master title style</a:t>
             </a:r>
             <a:endParaRPr lang="en-US" dirty="0"/>
@@ -1320,7 +1322,7 @@
           <a:p>
             <a:pPr lvl="0"/>
             <a:r>
-              <a:rPr lang="en-US" smtClean="0"/>
+              <a:rPr lang="en-US"/>
               <a:t>Click to edit Master text styles</a:t>
             </a:r>
           </a:p>
@@ -1343,7 +1345,7 @@
           <a:p>
             <a:fld id="{F39D0AC7-9083-8749-AA05-79D3CDD3A717}" type="datetimeFigureOut">
               <a:rPr lang="en-US" smtClean="0"/>
-              <a:t>10/2/17</a:t>
+              <a:t>10/3/2017</a:t>
             </a:fld>
             <a:endParaRPr lang="en-US"/>
           </a:p>
@@ -1432,7 +1434,7 @@
           <a:lstStyle/>
           <a:p>
             <a:r>
-              <a:rPr lang="en-US" smtClean="0"/>
+              <a:rPr lang="en-US"/>
               <a:t>Click to edit Master title style</a:t>
             </a:r>
             <a:endParaRPr lang="en-US" dirty="0"/>
@@ -1461,35 +1463,35 @@
           <a:p>
             <a:pPr lvl="0"/>
             <a:r>
-              <a:rPr lang="en-US" smtClean="0"/>
+              <a:rPr lang="en-US"/>
               <a:t>Click to edit Master text styles</a:t>
             </a:r>
           </a:p>
           <a:p>
             <a:pPr lvl="1"/>
             <a:r>
-              <a:rPr lang="en-US" smtClean="0"/>
+              <a:rPr lang="en-US"/>
               <a:t>Second level</a:t>
             </a:r>
           </a:p>
           <a:p>
             <a:pPr lvl="2"/>
             <a:r>
-              <a:rPr lang="en-US" smtClean="0"/>
+              <a:rPr lang="en-US"/>
               <a:t>Third level</a:t>
             </a:r>
           </a:p>
           <a:p>
             <a:pPr lvl="3"/>
             <a:r>
-              <a:rPr lang="en-US" smtClean="0"/>
+              <a:rPr lang="en-US"/>
               <a:t>Fourth level</a:t>
             </a:r>
           </a:p>
           <a:p>
             <a:pPr lvl="4"/>
             <a:r>
-              <a:rPr lang="en-US" smtClean="0"/>
+              <a:rPr lang="en-US"/>
               <a:t>Fifth level</a:t>
             </a:r>
             <a:endParaRPr lang="en-US" dirty="0"/>
@@ -1518,35 +1520,35 @@
           <a:p>
             <a:pPr lvl="0"/>
             <a:r>
-              <a:rPr lang="en-US" smtClean="0"/>
+              <a:rPr lang="en-US"/>
               <a:t>Click to edit Master text styles</a:t>
             </a:r>
           </a:p>
           <a:p>
             <a:pPr lvl="1"/>
             <a:r>
-              <a:rPr lang="en-US" smtClean="0"/>
+              <a:rPr lang="en-US"/>
               <a:t>Second level</a:t>
             </a:r>
           </a:p>
           <a:p>
             <a:pPr lvl="2"/>
             <a:r>
-              <a:rPr lang="en-US" smtClean="0"/>
+              <a:rPr lang="en-US"/>
               <a:t>Third level</a:t>
             </a:r>
           </a:p>
           <a:p>
             <a:pPr lvl="3"/>
             <a:r>
-              <a:rPr lang="en-US" smtClean="0"/>
+              <a:rPr lang="en-US"/>
               <a:t>Fourth level</a:t>
             </a:r>
           </a:p>
           <a:p>
             <a:pPr lvl="4"/>
             <a:r>
-              <a:rPr lang="en-US" smtClean="0"/>
+              <a:rPr lang="en-US"/>
               <a:t>Fifth level</a:t>
             </a:r>
             <a:endParaRPr lang="en-US" dirty="0"/>
@@ -1570,7 +1572,7 @@
           <a:p>
             <a:fld id="{F39D0AC7-9083-8749-AA05-79D3CDD3A717}" type="datetimeFigureOut">
               <a:rPr lang="en-US" smtClean="0"/>
-              <a:t>10/2/17</a:t>
+              <a:t>10/3/2017</a:t>
             </a:fld>
             <a:endParaRPr lang="en-US"/>
           </a:p>
@@ -1664,7 +1666,7 @@
           <a:lstStyle/>
           <a:p>
             <a:r>
-              <a:rPr lang="en-US" smtClean="0"/>
+              <a:rPr lang="en-US"/>
               <a:t>Click to edit Master title style</a:t>
             </a:r>
             <a:endParaRPr lang="en-US" dirty="0"/>
@@ -1730,7 +1732,7 @@
           <a:p>
             <a:pPr lvl="0"/>
             <a:r>
-              <a:rPr lang="en-US" smtClean="0"/>
+              <a:rPr lang="en-US"/>
               <a:t>Click to edit Master text styles</a:t>
             </a:r>
           </a:p>
@@ -1758,35 +1760,35 @@
           <a:p>
             <a:pPr lvl="0"/>
             <a:r>
-              <a:rPr lang="en-US" smtClean="0"/>
+              <a:rPr lang="en-US"/>
               <a:t>Click to edit Master text styles</a:t>
             </a:r>
           </a:p>
           <a:p>
             <a:pPr lvl="1"/>
             <a:r>
-              <a:rPr lang="en-US" smtClean="0"/>
+              <a:rPr lang="en-US"/>
               <a:t>Second level</a:t>
             </a:r>
           </a:p>
           <a:p>
             <a:pPr lvl="2"/>
             <a:r>
-              <a:rPr lang="en-US" smtClean="0"/>
+              <a:rPr lang="en-US"/>
               <a:t>Third level</a:t>
             </a:r>
           </a:p>
           <a:p>
             <a:pPr lvl="3"/>
             <a:r>
-              <a:rPr lang="en-US" smtClean="0"/>
+              <a:rPr lang="en-US"/>
               <a:t>Fourth level</a:t>
             </a:r>
           </a:p>
           <a:p>
             <a:pPr lvl="4"/>
             <a:r>
-              <a:rPr lang="en-US" smtClean="0"/>
+              <a:rPr lang="en-US"/>
               <a:t>Fifth level</a:t>
             </a:r>
             <a:endParaRPr lang="en-US" dirty="0"/>
@@ -1852,7 +1854,7 @@
           <a:p>
             <a:pPr lvl="0"/>
             <a:r>
-              <a:rPr lang="en-US" smtClean="0"/>
+              <a:rPr lang="en-US"/>
               <a:t>Click to edit Master text styles</a:t>
             </a:r>
           </a:p>
@@ -1880,35 +1882,35 @@
           <a:p>
             <a:pPr lvl="0"/>
             <a:r>
-              <a:rPr lang="en-US" smtClean="0"/>
+              <a:rPr lang="en-US"/>
               <a:t>Click to edit Master text styles</a:t>
             </a:r>
           </a:p>
           <a:p>
             <a:pPr lvl="1"/>
             <a:r>
-              <a:rPr lang="en-US" smtClean="0"/>
+              <a:rPr lang="en-US"/>
               <a:t>Second level</a:t>
             </a:r>
           </a:p>
           <a:p>
             <a:pPr lvl="2"/>
             <a:r>
-              <a:rPr lang="en-US" smtClean="0"/>
+              <a:rPr lang="en-US"/>
               <a:t>Third level</a:t>
             </a:r>
           </a:p>
           <a:p>
             <a:pPr lvl="3"/>
             <a:r>
-              <a:rPr lang="en-US" smtClean="0"/>
+              <a:rPr lang="en-US"/>
               <a:t>Fourth level</a:t>
             </a:r>
           </a:p>
           <a:p>
             <a:pPr lvl="4"/>
             <a:r>
-              <a:rPr lang="en-US" smtClean="0"/>
+              <a:rPr lang="en-US"/>
               <a:t>Fifth level</a:t>
             </a:r>
             <a:endParaRPr lang="en-US" dirty="0"/>
@@ -1932,7 +1934,7 @@
           <a:p>
             <a:fld id="{F39D0AC7-9083-8749-AA05-79D3CDD3A717}" type="datetimeFigureOut">
               <a:rPr lang="en-US" smtClean="0"/>
-              <a:t>10/2/17</a:t>
+              <a:t>10/3/2017</a:t>
             </a:fld>
             <a:endParaRPr lang="en-US"/>
           </a:p>
@@ -2021,7 +2023,7 @@
           <a:lstStyle/>
           <a:p>
             <a:r>
-              <a:rPr lang="en-US" smtClean="0"/>
+              <a:rPr lang="en-US"/>
               <a:t>Click to edit Master title style</a:t>
             </a:r>
             <a:endParaRPr lang="en-US" dirty="0"/>
@@ -2045,7 +2047,7 @@
           <a:p>
             <a:fld id="{F39D0AC7-9083-8749-AA05-79D3CDD3A717}" type="datetimeFigureOut">
               <a:rPr lang="en-US" smtClean="0"/>
-              <a:t>10/2/17</a:t>
+              <a:t>10/3/2017</a:t>
             </a:fld>
             <a:endParaRPr lang="en-US"/>
           </a:p>
@@ -2135,7 +2137,7 @@
           <a:p>
             <a:fld id="{F39D0AC7-9083-8749-AA05-79D3CDD3A717}" type="datetimeFigureOut">
               <a:rPr lang="en-US" smtClean="0"/>
-              <a:t>10/2/17</a:t>
+              <a:t>10/3/2017</a:t>
             </a:fld>
             <a:endParaRPr lang="en-US"/>
           </a:p>
@@ -2233,7 +2235,7 @@
           </a:lstStyle>
           <a:p>
             <a:r>
-              <a:rPr lang="en-US" smtClean="0"/>
+              <a:rPr lang="en-US"/>
               <a:t>Click to edit Master title style</a:t>
             </a:r>
             <a:endParaRPr lang="en-US" dirty="0"/>
@@ -2290,35 +2292,35 @@
           <a:p>
             <a:pPr lvl="0"/>
             <a:r>
-              <a:rPr lang="en-US" smtClean="0"/>
+              <a:rPr lang="en-US"/>
               <a:t>Click to edit Master text styles</a:t>
             </a:r>
           </a:p>
           <a:p>
             <a:pPr lvl="1"/>
             <a:r>
-              <a:rPr lang="en-US" smtClean="0"/>
+              <a:rPr lang="en-US"/>
               <a:t>Second level</a:t>
             </a:r>
           </a:p>
           <a:p>
             <a:pPr lvl="2"/>
             <a:r>
-              <a:rPr lang="en-US" smtClean="0"/>
+              <a:rPr lang="en-US"/>
               <a:t>Third level</a:t>
             </a:r>
           </a:p>
           <a:p>
             <a:pPr lvl="3"/>
             <a:r>
-              <a:rPr lang="en-US" smtClean="0"/>
+              <a:rPr lang="en-US"/>
               <a:t>Fourth level</a:t>
             </a:r>
           </a:p>
           <a:p>
             <a:pPr lvl="4"/>
             <a:r>
-              <a:rPr lang="en-US" smtClean="0"/>
+              <a:rPr lang="en-US"/>
               <a:t>Fifth level</a:t>
             </a:r>
             <a:endParaRPr lang="en-US" dirty="0"/>
@@ -2384,7 +2386,7 @@
           <a:p>
             <a:pPr lvl="0"/>
             <a:r>
-              <a:rPr lang="en-US" smtClean="0"/>
+              <a:rPr lang="en-US"/>
               <a:t>Click to edit Master text styles</a:t>
             </a:r>
           </a:p>
@@ -2407,7 +2409,7 @@
           <a:p>
             <a:fld id="{F39D0AC7-9083-8749-AA05-79D3CDD3A717}" type="datetimeFigureOut">
               <a:rPr lang="en-US" smtClean="0"/>
-              <a:t>10/2/17</a:t>
+              <a:t>10/3/2017</a:t>
             </a:fld>
             <a:endParaRPr lang="en-US"/>
           </a:p>
@@ -2505,7 +2507,7 @@
           </a:lstStyle>
           <a:p>
             <a:r>
-              <a:rPr lang="en-US" smtClean="0"/>
+              <a:rPr lang="en-US"/>
               <a:t>Click to edit Master title style</a:t>
             </a:r>
             <a:endParaRPr lang="en-US" dirty="0"/>
@@ -2570,7 +2572,7 @@
           </a:lstStyle>
           <a:p>
             <a:r>
-              <a:rPr lang="en-US" smtClean="0"/>
+              <a:rPr lang="en-US"/>
               <a:t>Drag picture to placeholder or click icon to add</a:t>
             </a:r>
             <a:endParaRPr lang="en-US" dirty="0"/>
@@ -2636,7 +2638,7 @@
           <a:p>
             <a:pPr lvl="0"/>
             <a:r>
-              <a:rPr lang="en-US" smtClean="0"/>
+              <a:rPr lang="en-US"/>
               <a:t>Click to edit Master text styles</a:t>
             </a:r>
           </a:p>
@@ -2659,7 +2661,7 @@
           <a:p>
             <a:fld id="{F39D0AC7-9083-8749-AA05-79D3CDD3A717}" type="datetimeFigureOut">
               <a:rPr lang="en-US" smtClean="0"/>
-              <a:t>10/2/17</a:t>
+              <a:t>10/3/2017</a:t>
             </a:fld>
             <a:endParaRPr lang="en-US"/>
           </a:p>
@@ -2763,7 +2765,7 @@
           <a:lstStyle/>
           <a:p>
             <a:r>
-              <a:rPr lang="en-US" smtClean="0"/>
+              <a:rPr lang="en-US"/>
               <a:t>Click to edit Master title style</a:t>
             </a:r>
             <a:endParaRPr lang="en-US" dirty="0"/>
@@ -2797,35 +2799,35 @@
           <a:p>
             <a:pPr lvl="0"/>
             <a:r>
-              <a:rPr lang="en-US" smtClean="0"/>
+              <a:rPr lang="en-US"/>
               <a:t>Click to edit Master text styles</a:t>
             </a:r>
           </a:p>
           <a:p>
             <a:pPr lvl="1"/>
             <a:r>
-              <a:rPr lang="en-US" smtClean="0"/>
+              <a:rPr lang="en-US"/>
               <a:t>Second level</a:t>
             </a:r>
           </a:p>
           <a:p>
             <a:pPr lvl="2"/>
             <a:r>
-              <a:rPr lang="en-US" smtClean="0"/>
+              <a:rPr lang="en-US"/>
               <a:t>Third level</a:t>
             </a:r>
           </a:p>
           <a:p>
             <a:pPr lvl="3"/>
             <a:r>
-              <a:rPr lang="en-US" smtClean="0"/>
+              <a:rPr lang="en-US"/>
               <a:t>Fourth level</a:t>
             </a:r>
           </a:p>
           <a:p>
             <a:pPr lvl="4"/>
             <a:r>
-              <a:rPr lang="en-US" smtClean="0"/>
+              <a:rPr lang="en-US"/>
               <a:t>Fifth level</a:t>
             </a:r>
             <a:endParaRPr lang="en-US" dirty="0"/>
@@ -2867,7 +2869,7 @@
           <a:p>
             <a:fld id="{F39D0AC7-9083-8749-AA05-79D3CDD3A717}" type="datetimeFigureOut">
               <a:rPr lang="en-US" smtClean="0"/>
-              <a:t>10/2/17</a:t>
+              <a:t>10/3/2017</a:t>
             </a:fld>
             <a:endParaRPr lang="en-US"/>
           </a:p>
@@ -3288,14 +3290,9 @@
           <a:lstStyle/>
           <a:p>
             <a:r>
-              <a:rPr lang="en-US" dirty="0" smtClean="0"/>
-              <a:t>Lab </a:t>
-            </a:r>
-            <a:r>
-              <a:rPr lang="en-US" dirty="0" smtClean="0"/>
-              <a:t>06</a:t>
-            </a:r>
-            <a:endParaRPr lang="en-US" dirty="0"/>
+              <a:rPr lang="en-US" dirty="0"/>
+              <a:t>Lab 06</a:t>
+            </a:r>
           </a:p>
         </p:txBody>
       </p:sp>
@@ -3317,30 +3314,29 @@
           <a:lstStyle/>
           <a:p>
             <a:r>
-              <a:rPr lang="en-US" dirty="0" smtClean="0"/>
+              <a:rPr lang="en-US" dirty="0"/>
               <a:t>Game of Turns</a:t>
             </a:r>
           </a:p>
           <a:p>
             <a:r>
-              <a:rPr lang="en-US" dirty="0" smtClean="0"/>
+              <a:rPr lang="en-US" dirty="0"/>
               <a:t>Practice of </a:t>
             </a:r>
             <a:r>
-              <a:rPr lang="en-US" dirty="0" err="1" smtClean="0"/>
+              <a:rPr lang="en-US" dirty="0" err="1"/>
               <a:t>sigaction</a:t>
             </a:r>
             <a:r>
-              <a:rPr lang="en-US" dirty="0" smtClean="0"/>
+              <a:rPr lang="en-US" dirty="0"/>
               <a:t>()</a:t>
             </a:r>
           </a:p>
           <a:p>
             <a:r>
-              <a:rPr lang="en-US" dirty="0" smtClean="0"/>
+              <a:rPr lang="en-US" dirty="0"/>
               <a:t>Do not use signal()</a:t>
             </a:r>
-            <a:endParaRPr lang="en-US" dirty="0"/>
           </a:p>
         </p:txBody>
       </p:sp>
@@ -3390,10 +3386,9 @@
           <a:lstStyle/>
           <a:p>
             <a:r>
-              <a:rPr lang="en-US" dirty="0" smtClean="0"/>
+              <a:rPr lang="en-US" dirty="0"/>
               <a:t>How does the game work?</a:t>
             </a:r>
-            <a:endParaRPr lang="en-US" dirty="0"/>
           </a:p>
         </p:txBody>
       </p:sp>
@@ -3413,9 +3408,23 @@
           <a:lstStyle/>
           <a:p>
             <a:r>
-              <a:rPr lang="en-US" altLang="zh-TW" dirty="0" smtClean="0"/>
-              <a:t>We would like to make the signal travel among all the processes, including the parent process, in a orderly circular fashion of total M turns.</a:t>
-            </a:r>
+              <a:rPr lang="en-US" altLang="zh-TW" dirty="0"/>
+              <a:t>We would like to make the signal travel among all the processes, stating from the parent process, in a orderly circular fashion for a total of M rounds.</a:t>
+            </a:r>
+          </a:p>
+          <a:p>
+            <a:r>
+              <a:rPr lang="en-US" dirty="0"/>
+              <a:t>Example: </a:t>
+            </a:r>
+            <a:br>
+              <a:rPr lang="en-US" dirty="0"/>
+            </a:br>
+            <a:r>
+              <a:rPr lang="en-US" dirty="0"/>
+              <a:t>P -&gt; C1 -&gt; C2 -&gt; C3 -&gt; P</a:t>
+            </a:r>
+            <a:endParaRPr lang="en-US" altLang="zh-TW" dirty="0"/>
           </a:p>
         </p:txBody>
       </p:sp>
@@ -3494,10 +3503,9 @@
           <a:lstStyle/>
           <a:p>
             <a:r>
-              <a:rPr lang="en-US" dirty="0" smtClean="0"/>
-              <a:t>How does the game work?</a:t>
-            </a:r>
-            <a:endParaRPr lang="en-US" dirty="0"/>
+              <a:rPr lang="en-US" dirty="0"/>
+              <a:t>Signal</a:t>
+            </a:r>
           </a:p>
         </p:txBody>
       </p:sp>
@@ -3517,139 +3525,31 @@
           <a:lstStyle/>
           <a:p>
             <a:r>
+              <a:rPr lang="en-US" dirty="0" err="1"/>
+              <a:t>sigaction</a:t>
+            </a:r>
+            <a:r>
               <a:rPr lang="en-US" dirty="0"/>
-              <a:t>Starting off the parent (origin), it sends the signal to its direct descendent. </a:t>
+              <a:t>()</a:t>
             </a:r>
           </a:p>
           <a:p>
             <a:r>
               <a:rPr lang="en-US" dirty="0"/>
-              <a:t>In turn, each child sends the signal to its direct descendent.</a:t>
+              <a:t>kill()</a:t>
             </a:r>
           </a:p>
           <a:p>
             <a:r>
               <a:rPr lang="en-US" dirty="0"/>
-              <a:t>For the last child, it sends the signal to the origin</a:t>
-            </a:r>
-            <a:r>
-              <a:rPr lang="en-US" dirty="0" smtClean="0"/>
-              <a:t>.</a:t>
-            </a:r>
-          </a:p>
-          <a:p>
-            <a:r>
-              <a:rPr lang="en-US" dirty="0" smtClean="0"/>
-              <a:t>Example: P -&gt; C1 -&gt; C2 -&gt; C3 -&gt; P</a:t>
-            </a:r>
-            <a:br>
-              <a:rPr lang="en-US" dirty="0" smtClean="0"/>
-            </a:br>
-            <a:endParaRPr lang="en-US" dirty="0"/>
-          </a:p>
-          <a:p>
-            <a:endParaRPr lang="en-US" dirty="0"/>
-          </a:p>
-          <a:p>
-            <a:endParaRPr lang="en-US" dirty="0"/>
-          </a:p>
-        </p:txBody>
-      </p:sp>
-    </p:spTree>
-    <p:extLst>
-      <p:ext uri="{BB962C8B-B14F-4D97-AF65-F5344CB8AC3E}">
-        <p14:creationId xmlns:p14="http://schemas.microsoft.com/office/powerpoint/2010/main" val="27429702"/>
-      </p:ext>
-    </p:extLst>
-  </p:cSld>
-  <p:clrMapOvr>
-    <a:masterClrMapping/>
-  </p:clrMapOvr>
-</p:sld>
-</file>
-
-<file path=ppt/slides/slide4.xml><?xml version="1.0" encoding="utf-8"?>
-<p:sld xmlns:a="http://schemas.openxmlformats.org/drawingml/2006/main" xmlns:r="http://schemas.openxmlformats.org/officeDocument/2006/relationships" xmlns:p="http://schemas.openxmlformats.org/presentationml/2006/main">
-  <p:cSld>
-    <p:spTree>
-      <p:nvGrpSpPr>
-        <p:cNvPr id="1" name=""/>
-        <p:cNvGrpSpPr/>
-        <p:nvPr/>
-      </p:nvGrpSpPr>
-      <p:grpSpPr>
-        <a:xfrm>
-          <a:off x="0" y="0"/>
-          <a:ext cx="0" cy="0"/>
-          <a:chOff x="0" y="0"/>
-          <a:chExt cx="0" cy="0"/>
-        </a:xfrm>
-      </p:grpSpPr>
-      <p:sp>
-        <p:nvSpPr>
-          <p:cNvPr id="2" name="Title 1"/>
-          <p:cNvSpPr>
-            <a:spLocks noGrp="1"/>
-          </p:cNvSpPr>
-          <p:nvPr>
-            <p:ph type="title"/>
-          </p:nvPr>
-        </p:nvSpPr>
-        <p:spPr/>
-        <p:txBody>
-          <a:bodyPr/>
-          <a:lstStyle/>
-          <a:p>
-            <a:r>
-              <a:rPr lang="en-US" dirty="0" smtClean="0"/>
-              <a:t>Signal</a:t>
-            </a:r>
-            <a:endParaRPr lang="en-US" dirty="0"/>
-          </a:p>
-        </p:txBody>
-      </p:sp>
-      <p:sp>
-        <p:nvSpPr>
-          <p:cNvPr id="3" name="Content Placeholder 2"/>
-          <p:cNvSpPr>
-            <a:spLocks noGrp="1"/>
-          </p:cNvSpPr>
-          <p:nvPr>
-            <p:ph idx="1"/>
-          </p:nvPr>
-        </p:nvSpPr>
-        <p:spPr/>
-        <p:txBody>
-          <a:bodyPr/>
-          <a:lstStyle/>
-          <a:p>
-            <a:r>
-              <a:rPr lang="en-US" dirty="0" err="1" smtClean="0"/>
-              <a:t>sigaction</a:t>
-            </a:r>
-            <a:r>
-              <a:rPr lang="en-US" dirty="0" smtClean="0"/>
-              <a:t>()</a:t>
-            </a:r>
-          </a:p>
-          <a:p>
-            <a:r>
-              <a:rPr lang="en-US" dirty="0" smtClean="0"/>
-              <a:t>kill()</a:t>
-            </a:r>
-          </a:p>
-          <a:p>
-            <a:r>
-              <a:rPr lang="en-US" dirty="0" smtClean="0"/>
               <a:t>SIGUSR1</a:t>
             </a:r>
           </a:p>
           <a:p>
             <a:r>
-              <a:rPr lang="en-US" dirty="0" smtClean="0"/>
+              <a:rPr lang="en-US" dirty="0"/>
               <a:t>SIGUSR2</a:t>
             </a:r>
-            <a:endParaRPr lang="en-US" dirty="0"/>
           </a:p>
         </p:txBody>
       </p:sp>

</xml_diff>